<commit_message>
Added initial solution for PersonSQLDatabase
</commit_message>
<xml_diff>
--- a/Azure storage.pptx
+++ b/Azure storage.pptx
@@ -120,7 +120,7 @@
   </p:defaultTextStyle>
   <p:extLst>
     <p:ext uri="{EFAFB233-063F-42B5-8137-9DF3F51BA10A}">
-      <p15:sldGuideLst xmlns="" xmlns:p15="http://schemas.microsoft.com/office/powerpoint/2012/main">
+      <p15:sldGuideLst xmlns:p15="http://schemas.microsoft.com/office/powerpoint/2012/main" xmlns="">
         <p15:guide id="1" orient="horz" pos="3151">
           <p15:clr>
             <a:srgbClr val="A4A3A4"/>
@@ -154,7 +154,7 @@
       </p15:sldGuideLst>
     </p:ext>
     <p:ext uri="{2D200454-40CA-4A62-9FC3-DE9A4176ACB9}">
-      <p15:notesGuideLst xmlns="" xmlns:p15="http://schemas.microsoft.com/office/powerpoint/2012/main">
+      <p15:notesGuideLst xmlns:p15="http://schemas.microsoft.com/office/powerpoint/2012/main" xmlns="">
         <p15:guide id="1" orient="horz" pos="2880">
           <p15:clr>
             <a:srgbClr val="A4A3A4"/>
@@ -196,7 +196,7 @@
     </p:spTree>
     <p:extLst>
       <p:ext uri="{BB962C8B-B14F-4D97-AF65-F5344CB8AC3E}">
-        <p14:creationId xmlns="" xmlns:p14="http://schemas.microsoft.com/office/powerpoint/2010/main" val="2074726050"/>
+        <p14:creationId xmlns:p14="http://schemas.microsoft.com/office/powerpoint/2010/main" xmlns="" val="2074726050"/>
       </p:ext>
     </p:extLst>
   </p:cSld>
@@ -365,7 +365,7 @@
     </p:spTree>
     <p:extLst>
       <p:ext uri="{BB962C8B-B14F-4D97-AF65-F5344CB8AC3E}">
-        <p14:creationId xmlns="" xmlns:p14="http://schemas.microsoft.com/office/powerpoint/2010/main" val="1996866432"/>
+        <p14:creationId xmlns:p14="http://schemas.microsoft.com/office/powerpoint/2010/main" xmlns="" val="1996866432"/>
       </p:ext>
     </p:extLst>
   </p:cSld>
@@ -558,7 +558,7 @@
     </p:spTree>
     <p:extLst>
       <p:ext uri="{BB962C8B-B14F-4D97-AF65-F5344CB8AC3E}">
-        <p14:creationId xmlns="" xmlns:p14="http://schemas.microsoft.com/office/powerpoint/2010/main" val="1578500439"/>
+        <p14:creationId xmlns:p14="http://schemas.microsoft.com/office/powerpoint/2010/main" xmlns="" val="1578500439"/>
       </p:ext>
     </p:extLst>
   </p:cSld>
@@ -631,7 +631,7 @@
     </p:spTree>
     <p:extLst>
       <p:ext uri="{BB962C8B-B14F-4D97-AF65-F5344CB8AC3E}">
-        <p14:creationId xmlns="" xmlns:p14="http://schemas.microsoft.com/office/powerpoint/2010/main" val="814994835"/>
+        <p14:creationId xmlns:p14="http://schemas.microsoft.com/office/powerpoint/2010/main" xmlns="" val="814994835"/>
       </p:ext>
     </p:extLst>
   </p:cSld>
@@ -1010,111 +1010,81 @@
         </p:nvSpPr>
         <p:spPr/>
         <p:txBody>
+          <a:bodyPr>
+            <a:normAutofit/>
+          </a:bodyPr>
+          <a:lstStyle/>
+          <a:p>
+            <a:r>
+              <a:rPr lang="nb-NO" dirty="0" smtClean="0"/>
+              <a:t>For OData</a:t>
+            </a:r>
+            <a:r>
+              <a:rPr lang="nb-NO" baseline="0" dirty="0" smtClean="0"/>
+              <a:t> problems</a:t>
+            </a:r>
+          </a:p>
+          <a:p>
+            <a:r>
+              <a:rPr lang="nb-NO" baseline="0" dirty="0" smtClean="0"/>
+              <a:t>Install-package Microsoft.Data.Odata –Version 5.0.2</a:t>
+            </a:r>
+            <a:endParaRPr lang="en-US" dirty="0"/>
+          </a:p>
+        </p:txBody>
+      </p:sp>
+    </p:spTree>
+  </p:cSld>
+  <p:clrMapOvr>
+    <a:masterClrMapping/>
+  </p:clrMapOvr>
+</p:notes>
+</file>
+
+<file path=ppt/notesSlides/notesSlide6.xml><?xml version="1.0" encoding="utf-8"?>
+<p:notes xmlns:a="http://schemas.openxmlformats.org/drawingml/2006/main" xmlns:r="http://schemas.openxmlformats.org/officeDocument/2006/relationships" xmlns:p="http://schemas.openxmlformats.org/presentationml/2006/main">
+  <p:cSld>
+    <p:spTree>
+      <p:nvGrpSpPr>
+        <p:cNvPr id="1" name=""/>
+        <p:cNvGrpSpPr/>
+        <p:nvPr/>
+      </p:nvGrpSpPr>
+      <p:grpSpPr>
+        <a:xfrm>
+          <a:off x="0" y="0"/>
+          <a:ext cx="0" cy="0"/>
+          <a:chOff x="0" y="0"/>
+          <a:chExt cx="0" cy="0"/>
+        </a:xfrm>
+      </p:grpSpPr>
+      <p:sp>
+        <p:nvSpPr>
+          <p:cNvPr id="2" name="Slide Image Placeholder 1"/>
+          <p:cNvSpPr>
+            <a:spLocks noGrp="1" noRot="1" noChangeAspect="1"/>
+          </p:cNvSpPr>
+          <p:nvPr>
+            <p:ph type="sldImg"/>
+          </p:nvPr>
+        </p:nvSpPr>
+        <p:spPr/>
+      </p:sp>
+      <p:sp>
+        <p:nvSpPr>
+          <p:cNvPr id="3" name="Notes Placeholder 2"/>
+          <p:cNvSpPr>
+            <a:spLocks noGrp="1"/>
+          </p:cNvSpPr>
+          <p:nvPr>
+            <p:ph type="body" idx="1"/>
+          </p:nvPr>
+        </p:nvSpPr>
+        <p:spPr/>
+        <p:txBody>
           <a:bodyPr/>
           <a:lstStyle/>
           <a:p>
-            <a:r>
-              <a:rPr lang="nb-NO" dirty="0" err="1" smtClean="0"/>
-              <a:t>Create</a:t>
-            </a:r>
-            <a:r>
-              <a:rPr lang="nb-NO" dirty="0" smtClean="0"/>
-              <a:t> </a:t>
-            </a:r>
-            <a:r>
-              <a:rPr lang="nb-NO" dirty="0" err="1" smtClean="0"/>
-              <a:t>two</a:t>
-            </a:r>
-            <a:r>
-              <a:rPr lang="nb-NO" dirty="0" smtClean="0"/>
-              <a:t> </a:t>
-            </a:r>
-            <a:r>
-              <a:rPr lang="nb-NO" dirty="0" err="1" smtClean="0"/>
-              <a:t>processess</a:t>
-            </a:r>
-            <a:r>
-              <a:rPr lang="nb-NO" dirty="0" smtClean="0"/>
-              <a:t> – </a:t>
-            </a:r>
-            <a:r>
-              <a:rPr lang="nb-NO" dirty="0" err="1" smtClean="0"/>
-              <a:t>exercise</a:t>
-            </a:r>
-            <a:r>
-              <a:rPr lang="nb-NO" dirty="0" smtClean="0"/>
-              <a:t> is to send </a:t>
-            </a:r>
-            <a:r>
-              <a:rPr lang="nb-NO" dirty="0" err="1" smtClean="0"/>
-              <a:t>something</a:t>
-            </a:r>
-            <a:r>
-              <a:rPr lang="nb-NO" dirty="0" smtClean="0"/>
-              <a:t> from </a:t>
-            </a:r>
-            <a:r>
-              <a:rPr lang="nb-NO" dirty="0" err="1" smtClean="0"/>
-              <a:t>one</a:t>
-            </a:r>
-            <a:r>
-              <a:rPr lang="nb-NO" dirty="0" smtClean="0"/>
-              <a:t> </a:t>
-            </a:r>
-            <a:r>
-              <a:rPr lang="nb-NO" dirty="0" err="1" smtClean="0"/>
-              <a:t>process</a:t>
-            </a:r>
-            <a:r>
-              <a:rPr lang="nb-NO" dirty="0" smtClean="0"/>
-              <a:t> to </a:t>
-            </a:r>
-            <a:r>
-              <a:rPr lang="nb-NO" dirty="0" err="1" smtClean="0"/>
-              <a:t>another</a:t>
-            </a:r>
-            <a:r>
-              <a:rPr lang="nb-NO" dirty="0" smtClean="0"/>
-              <a:t>, and </a:t>
-            </a:r>
-            <a:r>
-              <a:rPr lang="nb-NO" dirty="0" err="1" smtClean="0"/>
-              <a:t>reply</a:t>
-            </a:r>
-            <a:r>
-              <a:rPr lang="nb-NO" dirty="0" smtClean="0"/>
-              <a:t> back. Gå gjennom </a:t>
-            </a:r>
-            <a:r>
-              <a:rPr lang="nb-NO" dirty="0" err="1" smtClean="0"/>
-              <a:t>Tables</a:t>
-            </a:r>
-            <a:r>
-              <a:rPr lang="nb-NO" dirty="0" smtClean="0"/>
-              <a:t> and Queues</a:t>
-            </a:r>
-          </a:p>
-          <a:p>
-            <a:endParaRPr lang="nb-NO" dirty="0" smtClean="0"/>
-          </a:p>
-          <a:p>
-            <a:r>
-              <a:rPr lang="nb-NO" dirty="0" err="1" smtClean="0"/>
-              <a:t>Tables</a:t>
-            </a:r>
-            <a:r>
-              <a:rPr lang="nb-NO" dirty="0" smtClean="0"/>
-              <a:t>: http://www.windowsazure.com/en-us/develop/net/how-to-guides/table-services-v17/?fb=nb-no</a:t>
-            </a:r>
-          </a:p>
-          <a:p>
-            <a:endParaRPr lang="nb-NO" dirty="0" smtClean="0"/>
-          </a:p>
-          <a:p>
-            <a:r>
-              <a:rPr lang="nb-NO" dirty="0" smtClean="0"/>
-              <a:t>Queues: http://www.windowsazure.com/en-us/develop/net/how-to-guides/queue-service-v17/?fb=nb-no</a:t>
-            </a:r>
             <a:endParaRPr lang="nb-NO" dirty="0"/>
           </a:p>
         </p:txBody>
@@ -1122,7 +1092,7 @@
     </p:spTree>
     <p:extLst>
       <p:ext uri="{BB962C8B-B14F-4D97-AF65-F5344CB8AC3E}">
-        <p14:creationId xmlns="" xmlns:p14="http://schemas.microsoft.com/office/powerpoint/2010/main" val="1608679030"/>
+        <p14:creationId xmlns:p14="http://schemas.microsoft.com/office/powerpoint/2010/main" xmlns="" val="1608679030"/>
       </p:ext>
     </p:extLst>
   </p:cSld>
@@ -1563,7 +1533,7 @@
     </p:spTree>
     <p:extLst>
       <p:ext uri="{BB962C8B-B14F-4D97-AF65-F5344CB8AC3E}">
-        <p14:creationId xmlns="" xmlns:p14="http://schemas.microsoft.com/office/powerpoint/2010/main" val="440037211"/>
+        <p14:creationId xmlns:p14="http://schemas.microsoft.com/office/powerpoint/2010/main" xmlns="" val="440037211"/>
       </p:ext>
     </p:extLst>
   </p:cSld>
@@ -1889,7 +1859,7 @@
     </p:spTree>
     <p:extLst>
       <p:ext uri="{BB962C8B-B14F-4D97-AF65-F5344CB8AC3E}">
-        <p14:creationId xmlns="" xmlns:p14="http://schemas.microsoft.com/office/powerpoint/2010/main" val="3222867579"/>
+        <p14:creationId xmlns:p14="http://schemas.microsoft.com/office/powerpoint/2010/main" xmlns="" val="3222867579"/>
       </p:ext>
     </p:extLst>
   </p:cSld>
@@ -2213,7 +2183,7 @@
     </p:spTree>
     <p:extLst>
       <p:ext uri="{BB962C8B-B14F-4D97-AF65-F5344CB8AC3E}">
-        <p14:creationId xmlns="" xmlns:p14="http://schemas.microsoft.com/office/powerpoint/2010/main" val="2811351927"/>
+        <p14:creationId xmlns:p14="http://schemas.microsoft.com/office/powerpoint/2010/main" xmlns="" val="2811351927"/>
       </p:ext>
     </p:extLst>
   </p:cSld>
@@ -2658,7 +2628,7 @@
     </p:spTree>
     <p:extLst>
       <p:ext uri="{BB962C8B-B14F-4D97-AF65-F5344CB8AC3E}">
-        <p14:creationId xmlns="" xmlns:p14="http://schemas.microsoft.com/office/powerpoint/2010/main" val="3111684990"/>
+        <p14:creationId xmlns:p14="http://schemas.microsoft.com/office/powerpoint/2010/main" xmlns="" val="3111684990"/>
       </p:ext>
     </p:extLst>
   </p:cSld>
@@ -2948,7 +2918,7 @@
     </p:spTree>
     <p:extLst>
       <p:ext uri="{BB962C8B-B14F-4D97-AF65-F5344CB8AC3E}">
-        <p14:creationId xmlns="" xmlns:p14="http://schemas.microsoft.com/office/powerpoint/2010/main" val="3043716793"/>
+        <p14:creationId xmlns:p14="http://schemas.microsoft.com/office/powerpoint/2010/main" xmlns="" val="3043716793"/>
       </p:ext>
     </p:extLst>
   </p:cSld>
@@ -3238,7 +3208,7 @@
     </p:spTree>
     <p:extLst>
       <p:ext uri="{BB962C8B-B14F-4D97-AF65-F5344CB8AC3E}">
-        <p14:creationId xmlns="" xmlns:p14="http://schemas.microsoft.com/office/powerpoint/2010/main" val="1028623352"/>
+        <p14:creationId xmlns:p14="http://schemas.microsoft.com/office/powerpoint/2010/main" xmlns="" val="1028623352"/>
       </p:ext>
     </p:extLst>
   </p:cSld>
@@ -5120,7 +5090,7 @@
     </p:spTree>
     <p:extLst>
       <p:ext uri="{BB962C8B-B14F-4D97-AF65-F5344CB8AC3E}">
-        <p14:creationId xmlns="" xmlns:p14="http://schemas.microsoft.com/office/powerpoint/2010/main" val="3231289422"/>
+        <p14:creationId xmlns:p14="http://schemas.microsoft.com/office/powerpoint/2010/main" xmlns="" val="3231289422"/>
       </p:ext>
     </p:extLst>
   </p:cSld>
@@ -5230,7 +5200,7 @@
     </p:spTree>
     <p:extLst>
       <p:ext uri="{BB962C8B-B14F-4D97-AF65-F5344CB8AC3E}">
-        <p14:creationId xmlns="" xmlns:p14="http://schemas.microsoft.com/office/powerpoint/2010/main" val="2620203597"/>
+        <p14:creationId xmlns:p14="http://schemas.microsoft.com/office/powerpoint/2010/main" xmlns="" val="2620203597"/>
       </p:ext>
     </p:extLst>
   </p:cSld>
@@ -5495,7 +5465,7 @@
     </p:spTree>
     <p:extLst>
       <p:ext uri="{BB962C8B-B14F-4D97-AF65-F5344CB8AC3E}">
-        <p14:creationId xmlns="" xmlns:p14="http://schemas.microsoft.com/office/powerpoint/2010/main" val="2233508146"/>
+        <p14:creationId xmlns:p14="http://schemas.microsoft.com/office/powerpoint/2010/main" xmlns="" val="2233508146"/>
       </p:ext>
     </p:extLst>
   </p:cSld>
@@ -5533,7 +5503,7 @@
     </p:spTree>
     <p:extLst>
       <p:ext uri="{BB962C8B-B14F-4D97-AF65-F5344CB8AC3E}">
-        <p14:creationId xmlns="" xmlns:p14="http://schemas.microsoft.com/office/powerpoint/2010/main" val="3573938671"/>
+        <p14:creationId xmlns:p14="http://schemas.microsoft.com/office/powerpoint/2010/main" xmlns="" val="3573938671"/>
       </p:ext>
     </p:extLst>
   </p:cSld>
@@ -5860,7 +5830,7 @@
     </p:spTree>
     <p:extLst>
       <p:ext uri="{BB962C8B-B14F-4D97-AF65-F5344CB8AC3E}">
-        <p14:creationId xmlns="" xmlns:p14="http://schemas.microsoft.com/office/powerpoint/2010/main" val="3815692938"/>
+        <p14:creationId xmlns:p14="http://schemas.microsoft.com/office/powerpoint/2010/main" xmlns="" val="3815692938"/>
       </p:ext>
     </p:extLst>
   </p:cSld>
@@ -6041,7 +6011,7 @@
     </p:spTree>
     <p:extLst>
       <p:ext uri="{BB962C8B-B14F-4D97-AF65-F5344CB8AC3E}">
-        <p14:creationId xmlns="" xmlns:p14="http://schemas.microsoft.com/office/powerpoint/2010/main" val="1462879799"/>
+        <p14:creationId xmlns:p14="http://schemas.microsoft.com/office/powerpoint/2010/main" xmlns="" val="1462879799"/>
       </p:ext>
     </p:extLst>
   </p:cSld>
@@ -6480,7 +6450,7 @@
     </p:spTree>
     <p:extLst>
       <p:ext uri="{BB962C8B-B14F-4D97-AF65-F5344CB8AC3E}">
-        <p14:creationId xmlns="" xmlns:p14="http://schemas.microsoft.com/office/powerpoint/2010/main" val="1631701370"/>
+        <p14:creationId xmlns:p14="http://schemas.microsoft.com/office/powerpoint/2010/main" xmlns="" val="1631701370"/>
       </p:ext>
     </p:extLst>
   </p:cSld>
@@ -6604,7 +6574,7 @@
     </p:spTree>
     <p:extLst>
       <p:ext uri="{BB962C8B-B14F-4D97-AF65-F5344CB8AC3E}">
-        <p14:creationId xmlns="" xmlns:p14="http://schemas.microsoft.com/office/powerpoint/2010/main" val="4017336358"/>
+        <p14:creationId xmlns:p14="http://schemas.microsoft.com/office/powerpoint/2010/main" xmlns="" val="4017336358"/>
       </p:ext>
     </p:extLst>
   </p:cSld>
@@ -6747,7 +6717,7 @@
     </p:spTree>
     <p:extLst>
       <p:ext uri="{BB962C8B-B14F-4D97-AF65-F5344CB8AC3E}">
-        <p14:creationId xmlns="" xmlns:p14="http://schemas.microsoft.com/office/powerpoint/2010/main" val="2342583521"/>
+        <p14:creationId xmlns:p14="http://schemas.microsoft.com/office/powerpoint/2010/main" xmlns="" val="2342583521"/>
       </p:ext>
     </p:extLst>
   </p:cSld>
@@ -6968,7 +6938,7 @@
     </p:spTree>
     <p:extLst>
       <p:ext uri="{BB962C8B-B14F-4D97-AF65-F5344CB8AC3E}">
-        <p14:creationId xmlns="" xmlns:p14="http://schemas.microsoft.com/office/powerpoint/2010/main" val="3938044995"/>
+        <p14:creationId xmlns:p14="http://schemas.microsoft.com/office/powerpoint/2010/main" xmlns="" val="3938044995"/>
       </p:ext>
     </p:extLst>
   </p:cSld>
@@ -7507,7 +7477,7 @@
     </p:spTree>
     <p:extLst>
       <p:ext uri="{BB962C8B-B14F-4D97-AF65-F5344CB8AC3E}">
-        <p14:creationId xmlns="" xmlns:p14="http://schemas.microsoft.com/office/powerpoint/2010/main" val="1158567655"/>
+        <p14:creationId xmlns:p14="http://schemas.microsoft.com/office/powerpoint/2010/main" xmlns="" val="1158567655"/>
       </p:ext>
     </p:extLst>
   </p:cSld>
@@ -7885,7 +7855,7 @@
     </p:spTree>
     <p:extLst>
       <p:ext uri="{BB962C8B-B14F-4D97-AF65-F5344CB8AC3E}">
-        <p14:creationId xmlns="" xmlns:p14="http://schemas.microsoft.com/office/powerpoint/2010/main" val="2181809243"/>
+        <p14:creationId xmlns:p14="http://schemas.microsoft.com/office/powerpoint/2010/main" xmlns="" val="2181809243"/>
       </p:ext>
     </p:extLst>
   </p:cSld>
@@ -8662,7 +8632,7 @@
     </p:spTree>
     <p:extLst>
       <p:ext uri="{BB962C8B-B14F-4D97-AF65-F5344CB8AC3E}">
-        <p14:creationId xmlns="" xmlns:p14="http://schemas.microsoft.com/office/powerpoint/2010/main" val="2161638014"/>
+        <p14:creationId xmlns:p14="http://schemas.microsoft.com/office/powerpoint/2010/main" xmlns="" val="2161638014"/>
       </p:ext>
     </p:extLst>
   </p:cSld>
@@ -9625,7 +9595,7 @@
     </p:spTree>
     <p:extLst>
       <p:ext uri="{BB962C8B-B14F-4D97-AF65-F5344CB8AC3E}">
-        <p14:creationId xmlns="" xmlns:p14="http://schemas.microsoft.com/office/powerpoint/2010/main" val="593901232"/>
+        <p14:creationId xmlns:p14="http://schemas.microsoft.com/office/powerpoint/2010/main" xmlns="" val="593901232"/>
       </p:ext>
     </p:extLst>
   </p:cSld>
@@ -9792,7 +9762,7 @@
     </p:spTree>
     <p:extLst>
       <p:ext uri="{BB962C8B-B14F-4D97-AF65-F5344CB8AC3E}">
-        <p14:creationId xmlns="" xmlns:p14="http://schemas.microsoft.com/office/powerpoint/2010/main" val="925662914"/>
+        <p14:creationId xmlns:p14="http://schemas.microsoft.com/office/powerpoint/2010/main" xmlns="" val="925662914"/>
       </p:ext>
     </p:extLst>
   </p:cSld>
@@ -10113,7 +10083,7 @@
     </p:spTree>
     <p:extLst>
       <p:ext uri="{BB962C8B-B14F-4D97-AF65-F5344CB8AC3E}">
-        <p14:creationId xmlns="" xmlns:p14="http://schemas.microsoft.com/office/powerpoint/2010/main" val="2627694574"/>
+        <p14:creationId xmlns:p14="http://schemas.microsoft.com/office/powerpoint/2010/main" xmlns="" val="2627694574"/>
       </p:ext>
     </p:extLst>
   </p:cSld>
@@ -10313,7 +10283,7 @@
     </p:spTree>
     <p:extLst>
       <p:ext uri="{BB962C8B-B14F-4D97-AF65-F5344CB8AC3E}">
-        <p14:creationId xmlns="" xmlns:p14="http://schemas.microsoft.com/office/powerpoint/2010/main" val="881725626"/>
+        <p14:creationId xmlns:p14="http://schemas.microsoft.com/office/powerpoint/2010/main" xmlns="" val="881725626"/>
       </p:ext>
     </p:extLst>
   </p:cSld>
@@ -10632,7 +10602,7 @@
     </p:spTree>
     <p:extLst>
       <p:ext uri="{BB962C8B-B14F-4D97-AF65-F5344CB8AC3E}">
-        <p14:creationId xmlns="" xmlns:p14="http://schemas.microsoft.com/office/powerpoint/2010/main" val="2472564093"/>
+        <p14:creationId xmlns:p14="http://schemas.microsoft.com/office/powerpoint/2010/main" xmlns="" val="2472564093"/>
       </p:ext>
     </p:extLst>
   </p:cSld>
@@ -11020,7 +10990,7 @@
     </p:spTree>
     <p:extLst>
       <p:ext uri="{BB962C8B-B14F-4D97-AF65-F5344CB8AC3E}">
-        <p14:creationId xmlns="" xmlns:p14="http://schemas.microsoft.com/office/powerpoint/2010/main" val="844442129"/>
+        <p14:creationId xmlns:p14="http://schemas.microsoft.com/office/powerpoint/2010/main" xmlns="" val="844442129"/>
       </p:ext>
     </p:extLst>
   </p:cSld>
@@ -11253,7 +11223,7 @@
     </p:spTree>
     <p:extLst>
       <p:ext uri="{BB962C8B-B14F-4D97-AF65-F5344CB8AC3E}">
-        <p14:creationId xmlns="" xmlns:p14="http://schemas.microsoft.com/office/powerpoint/2010/main" val="1607786633"/>
+        <p14:creationId xmlns:p14="http://schemas.microsoft.com/office/powerpoint/2010/main" xmlns="" val="1607786633"/>
       </p:ext>
     </p:extLst>
   </p:cSld>
@@ -11486,7 +11456,7 @@
     </p:spTree>
     <p:extLst>
       <p:ext uri="{BB962C8B-B14F-4D97-AF65-F5344CB8AC3E}">
-        <p14:creationId xmlns="" xmlns:p14="http://schemas.microsoft.com/office/powerpoint/2010/main" val="3400319444"/>
+        <p14:creationId xmlns:p14="http://schemas.microsoft.com/office/powerpoint/2010/main" xmlns="" val="3400319444"/>
       </p:ext>
     </p:extLst>
   </p:cSld>
@@ -13311,7 +13281,7 @@
     </p:spTree>
     <p:extLst>
       <p:ext uri="{BB962C8B-B14F-4D97-AF65-F5344CB8AC3E}">
-        <p14:creationId xmlns="" xmlns:p14="http://schemas.microsoft.com/office/powerpoint/2010/main" val="1273682958"/>
+        <p14:creationId xmlns:p14="http://schemas.microsoft.com/office/powerpoint/2010/main" xmlns="" val="1273682958"/>
       </p:ext>
     </p:extLst>
   </p:cSld>
@@ -13416,7 +13386,7 @@
     </p:spTree>
     <p:extLst>
       <p:ext uri="{BB962C8B-B14F-4D97-AF65-F5344CB8AC3E}">
-        <p14:creationId xmlns="" xmlns:p14="http://schemas.microsoft.com/office/powerpoint/2010/main" val="3654216826"/>
+        <p14:creationId xmlns:p14="http://schemas.microsoft.com/office/powerpoint/2010/main" xmlns="" val="3654216826"/>
       </p:ext>
     </p:extLst>
   </p:cSld>
@@ -13672,7 +13642,7 @@
     </p:spTree>
     <p:extLst>
       <p:ext uri="{BB962C8B-B14F-4D97-AF65-F5344CB8AC3E}">
-        <p14:creationId xmlns="" xmlns:p14="http://schemas.microsoft.com/office/powerpoint/2010/main" val="2837040887"/>
+        <p14:creationId xmlns:p14="http://schemas.microsoft.com/office/powerpoint/2010/main" xmlns="" val="2837040887"/>
       </p:ext>
     </p:extLst>
   </p:cSld>
@@ -13705,7 +13675,7 @@
     </p:spTree>
     <p:extLst>
       <p:ext uri="{BB962C8B-B14F-4D97-AF65-F5344CB8AC3E}">
-        <p14:creationId xmlns="" xmlns:p14="http://schemas.microsoft.com/office/powerpoint/2010/main" val="3283581558"/>
+        <p14:creationId xmlns:p14="http://schemas.microsoft.com/office/powerpoint/2010/main" xmlns="" val="3283581558"/>
       </p:ext>
     </p:extLst>
   </p:cSld>
@@ -14027,7 +13997,7 @@
     </p:spTree>
     <p:extLst>
       <p:ext uri="{BB962C8B-B14F-4D97-AF65-F5344CB8AC3E}">
-        <p14:creationId xmlns="" xmlns:p14="http://schemas.microsoft.com/office/powerpoint/2010/main" val="1898900767"/>
+        <p14:creationId xmlns:p14="http://schemas.microsoft.com/office/powerpoint/2010/main" xmlns="" val="1898900767"/>
       </p:ext>
     </p:extLst>
   </p:cSld>
@@ -14305,7 +14275,7 @@
     </p:spTree>
     <p:extLst>
       <p:ext uri="{BB962C8B-B14F-4D97-AF65-F5344CB8AC3E}">
-        <p14:creationId xmlns="" xmlns:p14="http://schemas.microsoft.com/office/powerpoint/2010/main" val="88524111"/>
+        <p14:creationId xmlns:p14="http://schemas.microsoft.com/office/powerpoint/2010/main" xmlns="" val="88524111"/>
       </p:ext>
     </p:extLst>
   </p:cSld>
@@ -14901,7 +14871,7 @@
     </p:spTree>
     <p:extLst>
       <p:ext uri="{BB962C8B-B14F-4D97-AF65-F5344CB8AC3E}">
-        <p14:creationId xmlns="" xmlns:p14="http://schemas.microsoft.com/office/powerpoint/2010/main" val="2516167389"/>
+        <p14:creationId xmlns:p14="http://schemas.microsoft.com/office/powerpoint/2010/main" xmlns="" val="2516167389"/>
       </p:ext>
     </p:extLst>
   </p:cSld>
@@ -15336,7 +15306,7 @@
     </p:spTree>
     <p:extLst>
       <p:ext uri="{BB962C8B-B14F-4D97-AF65-F5344CB8AC3E}">
-        <p14:creationId xmlns="" xmlns:p14="http://schemas.microsoft.com/office/powerpoint/2010/main" val="545375010"/>
+        <p14:creationId xmlns:p14="http://schemas.microsoft.com/office/powerpoint/2010/main" xmlns="" val="545375010"/>
       </p:ext>
     </p:extLst>
   </p:cSld>
@@ -16170,7 +16140,7 @@
     </p:spTree>
     <p:extLst>
       <p:ext uri="{BB962C8B-B14F-4D97-AF65-F5344CB8AC3E}">
-        <p14:creationId xmlns="" xmlns:p14="http://schemas.microsoft.com/office/powerpoint/2010/main" val="2160493955"/>
+        <p14:creationId xmlns:p14="http://schemas.microsoft.com/office/powerpoint/2010/main" xmlns="" val="2160493955"/>
       </p:ext>
     </p:extLst>
   </p:cSld>
@@ -17190,7 +17160,7 @@
     </p:spTree>
     <p:extLst>
       <p:ext uri="{BB962C8B-B14F-4D97-AF65-F5344CB8AC3E}">
-        <p14:creationId xmlns="" xmlns:p14="http://schemas.microsoft.com/office/powerpoint/2010/main" val="2627431640"/>
+        <p14:creationId xmlns:p14="http://schemas.microsoft.com/office/powerpoint/2010/main" xmlns="" val="2627431640"/>
       </p:ext>
     </p:extLst>
   </p:cSld>
@@ -17414,7 +17384,7 @@
     </p:spTree>
     <p:extLst>
       <p:ext uri="{BB962C8B-B14F-4D97-AF65-F5344CB8AC3E}">
-        <p14:creationId xmlns="" xmlns:p14="http://schemas.microsoft.com/office/powerpoint/2010/main" val="1348929243"/>
+        <p14:creationId xmlns:p14="http://schemas.microsoft.com/office/powerpoint/2010/main" xmlns="" val="1348929243"/>
       </p:ext>
     </p:extLst>
   </p:cSld>
@@ -17611,7 +17581,7 @@
     </p:spTree>
     <p:extLst>
       <p:ext uri="{BB962C8B-B14F-4D97-AF65-F5344CB8AC3E}">
-        <p14:creationId xmlns="" xmlns:p14="http://schemas.microsoft.com/office/powerpoint/2010/main" val="2463004899"/>
+        <p14:creationId xmlns:p14="http://schemas.microsoft.com/office/powerpoint/2010/main" xmlns="" val="2463004899"/>
       </p:ext>
     </p:extLst>
   </p:cSld>
@@ -18076,7 +18046,7 @@
     </p:spTree>
     <p:extLst>
       <p:ext uri="{BB962C8B-B14F-4D97-AF65-F5344CB8AC3E}">
-        <p14:creationId xmlns="" xmlns:p14="http://schemas.microsoft.com/office/powerpoint/2010/main" val="680898653"/>
+        <p14:creationId xmlns:p14="http://schemas.microsoft.com/office/powerpoint/2010/main" xmlns="" val="680898653"/>
       </p:ext>
     </p:extLst>
   </p:cSld>
@@ -18210,7 +18180,7 @@
     </p:spTree>
     <p:extLst>
       <p:ext uri="{BB962C8B-B14F-4D97-AF65-F5344CB8AC3E}">
-        <p14:creationId xmlns="" xmlns:p14="http://schemas.microsoft.com/office/powerpoint/2010/main" val="2684481713"/>
+        <p14:creationId xmlns:p14="http://schemas.microsoft.com/office/powerpoint/2010/main" xmlns="" val="2684481713"/>
       </p:ext>
     </p:extLst>
   </p:cSld>
@@ -18356,7 +18326,7 @@
     </p:spTree>
     <p:extLst>
       <p:ext uri="{BB962C8B-B14F-4D97-AF65-F5344CB8AC3E}">
-        <p14:creationId xmlns="" xmlns:p14="http://schemas.microsoft.com/office/powerpoint/2010/main" val="2039692621"/>
+        <p14:creationId xmlns:p14="http://schemas.microsoft.com/office/powerpoint/2010/main" xmlns="" val="2039692621"/>
       </p:ext>
     </p:extLst>
   </p:cSld>
@@ -18829,7 +18799,7 @@
           <p:nvPr>
             <p:extLst>
               <p:ext uri="{D42A27DB-BD31-4B8C-83A1-F6EECF244321}">
-                <p14:modId xmlns="" xmlns:p14="http://schemas.microsoft.com/office/powerpoint/2010/main" val="3981844749"/>
+                <p14:modId xmlns:p14="http://schemas.microsoft.com/office/powerpoint/2010/main" xmlns="" val="3981844749"/>
               </p:ext>
             </p:extLst>
           </p:nvPr>
@@ -19159,14 +19129,14 @@
             </a:r>
             <a:r>
               <a:rPr lang="nb-NO" cap="none" dirty="0" smtClean="0">
-                <a:hlinkClick r:id="rId2"/>
+                <a:hlinkClick r:id="rId3"/>
               </a:rPr>
               <a:t>https</a:t>
             </a:r>
             <a:r>
               <a:rPr lang="nb-NO" cap="none" dirty="0" smtClean="0">
                 <a:sym typeface="Wingdings" pitchFamily="2" charset="2"/>
-                <a:hlinkClick r:id="rId2"/>
+                <a:hlinkClick r:id="rId3"/>
               </a:rPr>
               <a:t>://github.com/espenekvang/AzureStorage.git</a:t>
             </a:r>
@@ -19182,7 +19152,19 @@
               <a:rPr lang="nb-NO" cap="none" dirty="0" smtClean="0">
                 <a:sym typeface="Wingdings" pitchFamily="2" charset="2"/>
               </a:rPr>
-              <a:t>Open PersonCloud, very simple app that lists a number of persons</a:t>
+              <a:t>Open </a:t>
+            </a:r>
+            <a:r>
+              <a:rPr lang="nb-NO" cap="none" dirty="0" smtClean="0">
+                <a:sym typeface="Wingdings" pitchFamily="2" charset="2"/>
+              </a:rPr>
+              <a:t>PersonTableStorage, </a:t>
+            </a:r>
+            <a:r>
+              <a:rPr lang="nb-NO" cap="none" dirty="0" smtClean="0">
+                <a:sym typeface="Wingdings" pitchFamily="2" charset="2"/>
+              </a:rPr>
+              <a:t>very simple app that lists a number of persons</a:t>
             </a:r>
           </a:p>
           <a:p>
@@ -19208,21 +19190,34 @@
             </a:r>
             <a:r>
               <a:rPr lang="en-US" cap="none" dirty="0" smtClean="0">
-                <a:hlinkClick r:id="rId3"/>
+                <a:hlinkClick r:id="rId4"/>
               </a:rPr>
-              <a:t>http</a:t>
+              <a:t>http://www.windowsazure.com/en-us/develop/net/how-to-guides/table-services/?</a:t>
             </a:r>
             <a:r>
               <a:rPr lang="en-US" cap="none" dirty="0" smtClean="0">
-                <a:hlinkClick r:id="rId3"/>
-              </a:rPr>
-              <a:t>://www.windowsazure.com/en-us/develop/net/how-to-guides/table-services/?</a:t>
-            </a:r>
-            <a:r>
-              <a:rPr lang="en-US" cap="none" dirty="0" smtClean="0">
-                <a:hlinkClick r:id="rId3"/>
+                <a:hlinkClick r:id="rId4"/>
               </a:rPr>
               <a:t>fb=nb-no</a:t>
+            </a:r>
+            <a:endParaRPr lang="en-US" cap="none" dirty="0" smtClean="0"/>
+          </a:p>
+          <a:p>
+            <a:pPr marL="342900" indent="-342900">
+              <a:buAutoNum type="arabicPeriod"/>
+            </a:pPr>
+            <a:r>
+              <a:rPr lang="nb-NO" cap="none" dirty="0" smtClean="0"/>
+              <a:t>Add functionality to store a new person</a:t>
+            </a:r>
+          </a:p>
+          <a:p>
+            <a:pPr marL="342900" indent="-342900">
+              <a:buAutoNum type="arabicPeriod"/>
+            </a:pPr>
+            <a:r>
+              <a:rPr lang="nb-NO" cap="none" dirty="0" smtClean="0"/>
+              <a:t>Add functionality to detele a person</a:t>
             </a:r>
             <a:endParaRPr lang="en-US" cap="none" dirty="0" smtClean="0"/>
           </a:p>
@@ -19307,7 +19302,13 @@
           <a:p>
             <a:r>
               <a:rPr lang="nb-NO" dirty="0" smtClean="0"/>
-              <a:t>asdf</a:t>
+              <a:t>Relational Database management</a:t>
+            </a:r>
+          </a:p>
+          <a:p>
+            <a:r>
+              <a:rPr lang="nb-NO" dirty="0" smtClean="0"/>
+              <a:t>Based on sQL server technology</a:t>
             </a:r>
             <a:endParaRPr lang="nb-NO" dirty="0"/>
           </a:p>
@@ -19326,7 +19327,7 @@
         <p:spPr>
           <a:xfrm>
             <a:off x="376445" y="294936"/>
-            <a:ext cx="2059859" cy="261610"/>
+            <a:ext cx="1823256" cy="261610"/>
           </a:xfrm>
         </p:spPr>
         <p:txBody>
@@ -19334,16 +19335,8 @@
           <a:lstStyle/>
           <a:p>
             <a:r>
-              <a:rPr lang="nb-NO" dirty="0" err="1" smtClean="0"/>
-              <a:t>queue</a:t>
-            </a:r>
-            <a:r>
-              <a:rPr lang="nb-NO" dirty="0" smtClean="0"/>
-              <a:t> </a:t>
-            </a:r>
-            <a:r>
-              <a:rPr lang="nb-NO" dirty="0" err="1" smtClean="0"/>
-              <a:t>storage</a:t>
+              <a:rPr lang="nb-NO" dirty="0" smtClean="0"/>
+              <a:t>SQL Database</a:t>
             </a:r>
             <a:endParaRPr lang="nb-NO" dirty="0"/>
           </a:p>
@@ -19358,7 +19351,7 @@
           <p:nvPr>
             <p:extLst>
               <p:ext uri="{D42A27DB-BD31-4B8C-83A1-F6EECF244321}">
-                <p14:modId xmlns="" xmlns:p14="http://schemas.microsoft.com/office/powerpoint/2010/main" val="3981844749"/>
+                <p14:modId xmlns:p14="http://schemas.microsoft.com/office/powerpoint/2010/main" xmlns="" val="3981844749"/>
               </p:ext>
             </p:extLst>
           </p:nvPr>
@@ -19419,11 +19412,7 @@
                     <a:p>
                       <a:r>
                         <a:rPr lang="nb-NO" sz="1100" dirty="0" smtClean="0"/>
-                        <a:t>Inter-process</a:t>
-                      </a:r>
-                      <a:r>
-                        <a:rPr lang="nb-NO" sz="1100" baseline="0" dirty="0" smtClean="0"/>
-                        <a:t>  messages</a:t>
+                        <a:t>Relational database</a:t>
                       </a:r>
                       <a:endParaRPr lang="nb-NO" sz="1100" dirty="0"/>
                     </a:p>
@@ -19437,7 +19426,7 @@
                     <a:p>
                       <a:r>
                         <a:rPr lang="nb-NO" sz="1100" baseline="0" dirty="0" smtClean="0"/>
-                        <a:t>100TB</a:t>
+                        <a:t>150GB</a:t>
                       </a:r>
                       <a:endParaRPr lang="nb-NO" sz="1100" dirty="0"/>
                     </a:p>
@@ -19449,36 +19438,10 @@
           </a:graphicData>
         </a:graphic>
       </p:graphicFrame>
-      <p:pic>
-        <p:nvPicPr>
-          <p:cNvPr id="9218" name="Picture 2" descr="Queue1"/>
-          <p:cNvPicPr>
-            <a:picLocks noChangeAspect="1" noChangeArrowheads="1"/>
-          </p:cNvPicPr>
-          <p:nvPr/>
-        </p:nvPicPr>
-        <p:blipFill>
-          <a:blip r:embed="rId3"/>
-          <a:srcRect/>
-          <a:stretch>
-            <a:fillRect/>
-          </a:stretch>
-        </p:blipFill>
-        <p:spPr bwMode="auto">
-          <a:xfrm>
-            <a:off x="5728780" y="3118756"/>
-            <a:ext cx="3011994" cy="1878693"/>
-          </a:xfrm>
-          <a:prstGeom prst="rect">
-            <a:avLst/>
-          </a:prstGeom>
-          <a:noFill/>
-        </p:spPr>
-      </p:pic>
     </p:spTree>
     <p:extLst>
       <p:ext uri="{BB962C8B-B14F-4D97-AF65-F5344CB8AC3E}">
-        <p14:creationId xmlns="" xmlns:p14="http://schemas.microsoft.com/office/powerpoint/2010/main" val="2965801257"/>
+        <p14:creationId xmlns:p14="http://schemas.microsoft.com/office/powerpoint/2010/main" xmlns="" val="2965801257"/>
       </p:ext>
     </p:extLst>
   </p:cSld>
@@ -19517,52 +19480,386 @@
       </p:grpSpPr>
       <p:sp>
         <p:nvSpPr>
-          <p:cNvPr id="2" name="Content Placeholder 1"/>
+          <p:cNvPr id="3" name="Title 2"/>
           <p:cNvSpPr>
             <a:spLocks noGrp="1"/>
           </p:cNvSpPr>
           <p:nvPr>
-            <p:ph idx="1"/>
+            <p:ph type="title"/>
           </p:nvPr>
         </p:nvSpPr>
-        <p:spPr/>
+        <p:spPr>
+          <a:xfrm>
+            <a:off x="376445" y="294936"/>
+            <a:ext cx="3121047" cy="261610"/>
+          </a:xfrm>
+        </p:spPr>
         <p:txBody>
           <a:bodyPr/>
           <a:lstStyle/>
           <a:p>
             <a:r>
-              <a:rPr lang="en-US" cap="none" dirty="0" smtClean="0"/>
-              <a:t>http://www.windowsazure.com/en-us/develop/net/how-to-guides/queue-service/?fb=nb-no</a:t>
-            </a:r>
-            <a:endParaRPr lang="en-US" cap="none" dirty="0"/>
+              <a:rPr lang="nb-NO" dirty="0" smtClean="0"/>
+              <a:t>SQL Database - </a:t>
+            </a:r>
+            <a:r>
+              <a:rPr lang="nb-NO" dirty="0" smtClean="0"/>
+              <a:t>Exercise</a:t>
+            </a:r>
+            <a:endParaRPr lang="en-US" dirty="0"/>
           </a:p>
         </p:txBody>
       </p:sp>
       <p:sp>
         <p:nvSpPr>
-          <p:cNvPr id="3" name="Title 2"/>
-          <p:cNvSpPr>
-            <a:spLocks noGrp="1"/>
+          <p:cNvPr id="5" name="Content Placeholder 1"/>
+          <p:cNvSpPr txBox="1">
+            <a:spLocks/>
           </p:cNvSpPr>
-          <p:nvPr>
-            <p:ph type="title"/>
-          </p:nvPr>
+          <p:nvPr/>
         </p:nvSpPr>
         <p:spPr>
           <a:xfrm>
-            <a:off x="376445" y="294936"/>
-            <a:ext cx="3357650" cy="261610"/>
-          </a:xfrm>
+            <a:off x="376445" y="949146"/>
+            <a:ext cx="8354007" cy="3956863"/>
+          </a:xfrm>
+          <a:prstGeom prst="rect">
+            <a:avLst/>
+          </a:prstGeom>
         </p:spPr>
         <p:txBody>
-          <a:bodyPr/>
+          <a:bodyPr vert="horz" lIns="91440" tIns="45720" rIns="91440" bIns="327600" rtlCol="0" anchor="b" anchorCtr="0">
+            <a:noAutofit/>
+          </a:bodyPr>
           <a:lstStyle/>
           <a:p>
-            <a:r>
-              <a:rPr lang="nb-NO" dirty="0" smtClean="0"/>
-              <a:t>Queue storage - Exercise</a:t>
-            </a:r>
-            <a:endParaRPr lang="en-US" dirty="0"/>
+            <a:pPr marL="342900" marR="0" lvl="0" indent="-342900" algn="l" defTabSz="457200" rtl="0" eaLnBrk="1" fontAlgn="auto" latinLnBrk="0" hangingPunct="1">
+              <a:lnSpc>
+                <a:spcPts val="1700"/>
+              </a:lnSpc>
+              <a:spcBef>
+                <a:spcPts val="1200"/>
+              </a:spcBef>
+              <a:spcAft>
+                <a:spcPts val="400"/>
+              </a:spcAft>
+              <a:buClrTx/>
+              <a:buSzTx/>
+              <a:buFont typeface="Arial"/>
+              <a:buAutoNum type="arabicPeriod"/>
+              <a:tabLst/>
+              <a:defRPr/>
+            </a:pPr>
+            <a:r>
+              <a:rPr kumimoji="0" lang="nb-NO" sz="1400" b="0" i="0" u="none" strike="noStrike" kern="1200" cap="none" spc="0" normalizeH="0" baseline="0" noProof="0" dirty="0" smtClean="0">
+                <a:ln>
+                  <a:noFill/>
+                </a:ln>
+                <a:solidFill>
+                  <a:schemeClr val="tx1"/>
+                </a:solidFill>
+                <a:effectLst/>
+                <a:uLnTx/>
+                <a:uFillTx/>
+                <a:latin typeface="Georgia"/>
+                <a:ea typeface="+mn-ea"/>
+                <a:cs typeface="Georgia"/>
+              </a:rPr>
+              <a:t>Clone repository </a:t>
+            </a:r>
+            <a:r>
+              <a:rPr kumimoji="0" lang="nb-NO" sz="1400" b="0" i="0" u="none" strike="noStrike" kern="1200" cap="none" spc="0" normalizeH="0" baseline="0" noProof="0" dirty="0" smtClean="0">
+                <a:ln>
+                  <a:noFill/>
+                </a:ln>
+                <a:solidFill>
+                  <a:schemeClr val="tx1"/>
+                </a:solidFill>
+                <a:effectLst/>
+                <a:uLnTx/>
+                <a:uFillTx/>
+                <a:latin typeface="Georgia"/>
+                <a:ea typeface="+mn-ea"/>
+                <a:cs typeface="Georgia"/>
+                <a:hlinkClick r:id="rId2"/>
+              </a:rPr>
+              <a:t>https</a:t>
+            </a:r>
+            <a:r>
+              <a:rPr kumimoji="0" lang="nb-NO" sz="1400" b="0" i="0" u="none" strike="noStrike" kern="1200" cap="none" spc="0" normalizeH="0" baseline="0" noProof="0" dirty="0" smtClean="0">
+                <a:ln>
+                  <a:noFill/>
+                </a:ln>
+                <a:solidFill>
+                  <a:schemeClr val="tx1"/>
+                </a:solidFill>
+                <a:effectLst/>
+                <a:uLnTx/>
+                <a:uFillTx/>
+                <a:latin typeface="Georgia"/>
+                <a:ea typeface="+mn-ea"/>
+                <a:cs typeface="Georgia"/>
+                <a:sym typeface="Wingdings" pitchFamily="2" charset="2"/>
+                <a:hlinkClick r:id="rId2"/>
+              </a:rPr>
+              <a:t>://github.com/espenekvang/AzureStorage.git</a:t>
+            </a:r>
+            <a:endParaRPr kumimoji="0" lang="nb-NO" sz="1400" b="0" i="0" u="none" strike="noStrike" kern="1200" cap="none" spc="0" normalizeH="0" baseline="0" noProof="0" dirty="0" smtClean="0">
+              <a:ln>
+                <a:noFill/>
+              </a:ln>
+              <a:solidFill>
+                <a:schemeClr val="tx1"/>
+              </a:solidFill>
+              <a:effectLst/>
+              <a:uLnTx/>
+              <a:uFillTx/>
+              <a:latin typeface="Georgia"/>
+              <a:ea typeface="+mn-ea"/>
+              <a:cs typeface="Georgia"/>
+              <a:sym typeface="Wingdings" pitchFamily="2" charset="2"/>
+            </a:endParaRPr>
+          </a:p>
+          <a:p>
+            <a:pPr marL="342900" marR="0" lvl="0" indent="-342900" algn="l" defTabSz="457200" rtl="0" eaLnBrk="1" fontAlgn="auto" latinLnBrk="0" hangingPunct="1">
+              <a:lnSpc>
+                <a:spcPts val="1700"/>
+              </a:lnSpc>
+              <a:spcBef>
+                <a:spcPts val="1200"/>
+              </a:spcBef>
+              <a:spcAft>
+                <a:spcPts val="400"/>
+              </a:spcAft>
+              <a:buClrTx/>
+              <a:buSzTx/>
+              <a:buFont typeface="Arial"/>
+              <a:buAutoNum type="arabicPeriod"/>
+              <a:tabLst/>
+              <a:defRPr/>
+            </a:pPr>
+            <a:r>
+              <a:rPr kumimoji="0" lang="nb-NO" sz="1400" b="0" i="0" u="none" strike="noStrike" kern="1200" cap="none" spc="0" normalizeH="0" baseline="0" noProof="0" dirty="0" smtClean="0">
+                <a:ln>
+                  <a:noFill/>
+                </a:ln>
+                <a:solidFill>
+                  <a:schemeClr val="tx1"/>
+                </a:solidFill>
+                <a:effectLst/>
+                <a:uLnTx/>
+                <a:uFillTx/>
+                <a:latin typeface="Georgia"/>
+                <a:ea typeface="+mn-ea"/>
+                <a:cs typeface="Georgia"/>
+                <a:sym typeface="Wingdings" pitchFamily="2" charset="2"/>
+              </a:rPr>
+              <a:t>Open PersonTableStorage, very simple app that lists a number of persons</a:t>
+            </a:r>
+          </a:p>
+          <a:p>
+            <a:pPr marL="342900" marR="0" lvl="0" indent="-342900" algn="l" defTabSz="457200" rtl="0" eaLnBrk="1" fontAlgn="auto" latinLnBrk="0" hangingPunct="1">
+              <a:lnSpc>
+                <a:spcPts val="1700"/>
+              </a:lnSpc>
+              <a:spcBef>
+                <a:spcPts val="1200"/>
+              </a:spcBef>
+              <a:spcAft>
+                <a:spcPts val="400"/>
+              </a:spcAft>
+              <a:buClrTx/>
+              <a:buSzTx/>
+              <a:buFont typeface="Arial"/>
+              <a:buAutoNum type="arabicPeriod"/>
+              <a:tabLst/>
+              <a:defRPr/>
+            </a:pPr>
+            <a:r>
+              <a:rPr kumimoji="0" lang="nb-NO" sz="1400" b="0" i="0" u="none" strike="noStrike" kern="1200" cap="none" spc="0" normalizeH="0" baseline="0" noProof="0" dirty="0" smtClean="0">
+                <a:ln>
+                  <a:noFill/>
+                </a:ln>
+                <a:solidFill>
+                  <a:schemeClr val="tx1"/>
+                </a:solidFill>
+                <a:effectLst/>
+                <a:uLnTx/>
+                <a:uFillTx/>
+                <a:latin typeface="Georgia"/>
+                <a:ea typeface="+mn-ea"/>
+                <a:cs typeface="Georgia"/>
+                <a:sym typeface="Wingdings" pitchFamily="2" charset="2"/>
+              </a:rPr>
+              <a:t>Store all persons in Azure SQL Database instead of in code as it is now</a:t>
+            </a:r>
+          </a:p>
+          <a:p>
+            <a:pPr marL="342900" lvl="0" indent="-342900">
+              <a:lnSpc>
+                <a:spcPts val="1700"/>
+              </a:lnSpc>
+              <a:spcBef>
+                <a:spcPts val="1200"/>
+              </a:spcBef>
+              <a:spcAft>
+                <a:spcPts val="400"/>
+              </a:spcAft>
+              <a:buFont typeface="Arial"/>
+              <a:buAutoNum type="arabicPeriod"/>
+            </a:pPr>
+            <a:r>
+              <a:rPr lang="nb-NO" sz="1400" dirty="0" smtClean="0">
+                <a:cs typeface="Georgia"/>
+                <a:sym typeface="Wingdings" pitchFamily="2" charset="2"/>
+              </a:rPr>
+              <a:t>Hint </a:t>
+            </a:r>
+            <a:r>
+              <a:rPr lang="nb-NO" sz="1400" dirty="0" smtClean="0">
+                <a:cs typeface="Georgia"/>
+                <a:sym typeface="Wingdings" pitchFamily="2" charset="2"/>
+                <a:hlinkClick r:id="rId3"/>
+              </a:rPr>
+              <a:t>http://www.windowsazure.com/en-us/develop/net/how-to-guides/sql-database/?</a:t>
+            </a:r>
+            <a:r>
+              <a:rPr lang="nb-NO" sz="1400" dirty="0" smtClean="0">
+                <a:cs typeface="Georgia"/>
+                <a:sym typeface="Wingdings" pitchFamily="2" charset="2"/>
+                <a:hlinkClick r:id="rId3"/>
+              </a:rPr>
+              <a:t>fb=nb-no</a:t>
+            </a:r>
+            <a:r>
+              <a:rPr lang="nb-NO" sz="1400" dirty="0" smtClean="0">
+                <a:cs typeface="Georgia"/>
+                <a:sym typeface="Wingdings" pitchFamily="2" charset="2"/>
+              </a:rPr>
+              <a:t> </a:t>
+            </a:r>
+          </a:p>
+          <a:p>
+            <a:pPr marL="342900" lvl="0" indent="-342900">
+              <a:lnSpc>
+                <a:spcPts val="1700"/>
+              </a:lnSpc>
+              <a:spcBef>
+                <a:spcPts val="1200"/>
+              </a:spcBef>
+              <a:spcAft>
+                <a:spcPts val="400"/>
+              </a:spcAft>
+              <a:buFont typeface="Arial"/>
+              <a:buAutoNum type="arabicPeriod"/>
+            </a:pPr>
+            <a:r>
+              <a:rPr lang="nb-NO" sz="1400" dirty="0" smtClean="0">
+                <a:cs typeface="Georgia"/>
+                <a:sym typeface="Wingdings" pitchFamily="2" charset="2"/>
+              </a:rPr>
+              <a:t> </a:t>
+            </a:r>
+            <a:r>
+              <a:rPr kumimoji="0" lang="nb-NO" sz="1400" b="0" i="0" u="none" strike="noStrike" kern="1200" cap="none" spc="0" normalizeH="0" baseline="0" noProof="0" dirty="0" smtClean="0">
+                <a:ln>
+                  <a:noFill/>
+                </a:ln>
+                <a:solidFill>
+                  <a:schemeClr val="tx1"/>
+                </a:solidFill>
+                <a:effectLst/>
+                <a:uLnTx/>
+                <a:uFillTx/>
+                <a:latin typeface="Georgia"/>
+                <a:ea typeface="+mn-ea"/>
+                <a:cs typeface="Georgia"/>
+              </a:rPr>
+              <a:t>Add functionality to store a new person</a:t>
+            </a:r>
+          </a:p>
+          <a:p>
+            <a:pPr marL="342900" marR="0" lvl="0" indent="-342900" algn="l" defTabSz="457200" rtl="0" eaLnBrk="1" fontAlgn="auto" latinLnBrk="0" hangingPunct="1">
+              <a:lnSpc>
+                <a:spcPts val="1700"/>
+              </a:lnSpc>
+              <a:spcBef>
+                <a:spcPts val="1200"/>
+              </a:spcBef>
+              <a:spcAft>
+                <a:spcPts val="400"/>
+              </a:spcAft>
+              <a:buClrTx/>
+              <a:buSzTx/>
+              <a:buFont typeface="Arial"/>
+              <a:buAutoNum type="arabicPeriod"/>
+              <a:tabLst/>
+              <a:defRPr/>
+            </a:pPr>
+            <a:r>
+              <a:rPr kumimoji="0" lang="nb-NO" sz="1400" b="0" i="0" u="none" strike="noStrike" kern="1200" cap="none" spc="0" normalizeH="0" baseline="0" noProof="0" dirty="0" smtClean="0">
+                <a:ln>
+                  <a:noFill/>
+                </a:ln>
+                <a:solidFill>
+                  <a:schemeClr val="tx1"/>
+                </a:solidFill>
+                <a:effectLst/>
+                <a:uLnTx/>
+                <a:uFillTx/>
+                <a:latin typeface="Georgia"/>
+                <a:ea typeface="+mn-ea"/>
+                <a:cs typeface="Georgia"/>
+              </a:rPr>
+              <a:t>Add functionality to detele a person</a:t>
+            </a:r>
+            <a:endParaRPr kumimoji="0" lang="en-US" sz="1400" b="0" i="0" u="none" strike="noStrike" kern="1200" cap="none" spc="0" normalizeH="0" baseline="0" noProof="0" dirty="0" smtClean="0">
+              <a:ln>
+                <a:noFill/>
+              </a:ln>
+              <a:solidFill>
+                <a:schemeClr val="tx1"/>
+              </a:solidFill>
+              <a:effectLst/>
+              <a:uLnTx/>
+              <a:uFillTx/>
+              <a:latin typeface="Georgia"/>
+              <a:ea typeface="+mn-ea"/>
+              <a:cs typeface="Georgia"/>
+            </a:endParaRPr>
+          </a:p>
+          <a:p>
+            <a:pPr marL="342900" marR="0" lvl="0" indent="-342900" algn="l" defTabSz="457200" rtl="0" eaLnBrk="1" fontAlgn="auto" latinLnBrk="0" hangingPunct="1">
+              <a:lnSpc>
+                <a:spcPts val="1700"/>
+              </a:lnSpc>
+              <a:spcBef>
+                <a:spcPts val="1200"/>
+              </a:spcBef>
+              <a:spcAft>
+                <a:spcPts val="400"/>
+              </a:spcAft>
+              <a:buClrTx/>
+              <a:buSzTx/>
+              <a:buFont typeface="Arial"/>
+              <a:buAutoNum type="arabicPeriod"/>
+              <a:tabLst/>
+              <a:defRPr/>
+            </a:pPr>
+            <a:endParaRPr kumimoji="0" lang="en-US" sz="1400" b="0" i="0" u="none" strike="noStrike" kern="1200" cap="none" spc="0" normalizeH="0" baseline="0" noProof="0" dirty="0">
+              <a:ln>
+                <a:noFill/>
+              </a:ln>
+              <a:solidFill>
+                <a:schemeClr val="tx1"/>
+              </a:solidFill>
+              <a:effectLst/>
+              <a:uLnTx/>
+              <a:uFillTx/>
+              <a:latin typeface="Georgia"/>
+              <a:ea typeface="+mn-ea"/>
+              <a:cs typeface="Georgia"/>
+            </a:endParaRPr>
           </a:p>
         </p:txBody>
       </p:sp>
@@ -19690,7 +19987,7 @@
     </p:spTree>
     <p:extLst>
       <p:ext uri="{BB962C8B-B14F-4D97-AF65-F5344CB8AC3E}">
-        <p14:creationId xmlns="" xmlns:p14="http://schemas.microsoft.com/office/powerpoint/2010/main" val="3900164081"/>
+        <p14:creationId xmlns:p14="http://schemas.microsoft.com/office/powerpoint/2010/main" xmlns="" val="3900164081"/>
       </p:ext>
     </p:extLst>
   </p:cSld>

</xml_diff>